<commit_message>
made a new figure for SEV annual report
</commit_message>
<xml_diff>
--- a/Miller_LTER_SciCouncil_2020.pptx
+++ b/Miller_LTER_SciCouncil_2020.pptx
@@ -6,6 +6,7 @@
   </p:sldMasterIdLst>
   <p:sldIdLst>
     <p:sldId id="256" r:id="rId2"/>
+    <p:sldId id="257" r:id="rId3"/>
   </p:sldIdLst>
   <p:sldSz cx="12192000" cy="6858000"/>
   <p:notesSz cx="6858000" cy="9144000"/>
@@ -104,7 +105,24 @@
       </a:defRPr>
     </a:lvl9pPr>
   </p:defaultTextStyle>
+  <p:extLst>
+    <p:ext uri="{EFAFB233-063F-42B5-8137-9DF3F51BA10A}">
+      <p15:sldGuideLst xmlns:p15="http://schemas.microsoft.com/office/powerpoint/2012/main"/>
+    </p:ext>
+  </p:extLst>
 </p:presentation>
+</file>
+
+<file path=ppt/commentAuthors.xml><?xml version="1.0" encoding="utf-8"?>
+<p:cmAuthorLst xmlns:a="http://schemas.openxmlformats.org/drawingml/2006/main" xmlns:r="http://schemas.openxmlformats.org/officeDocument/2006/relationships" xmlns:p="http://schemas.openxmlformats.org/presentationml/2006/main">
+  <p:cmAuthor id="1" name="Thomas E Miller" initials="TEM" lastIdx="2" clrIdx="0">
+    <p:extLst>
+      <p:ext uri="{19B8F6BF-5375-455C-9EA6-DF929625EA0E}">
+        <p15:presenceInfo xmlns:p15="http://schemas.microsoft.com/office/powerpoint/2012/main" userId="S-1-5-21-3981718292-3147017437-2455724297-149539" providerId="AD"/>
+      </p:ext>
+    </p:extLst>
+  </p:cmAuthor>
+</p:cmAuthorLst>
 </file>
 
 <file path=ppt/slideLayouts/slideLayout1.xml><?xml version="1.0" encoding="utf-8"?>
@@ -238,7 +256,7 @@
           <a:p>
             <a:fld id="{258C3A4D-8173-4480-8839-1F414A4844D0}" type="datetimeFigureOut">
               <a:rPr lang="en-US" smtClean="0"/>
-              <a:t>5/1/2020</a:t>
+              <a:t>6/9/2020</a:t>
             </a:fld>
             <a:endParaRPr lang="en-US"/>
           </a:p>
@@ -408,7 +426,7 @@
           <a:p>
             <a:fld id="{258C3A4D-8173-4480-8839-1F414A4844D0}" type="datetimeFigureOut">
               <a:rPr lang="en-US" smtClean="0"/>
-              <a:t>5/1/2020</a:t>
+              <a:t>6/9/2020</a:t>
             </a:fld>
             <a:endParaRPr lang="en-US"/>
           </a:p>
@@ -588,7 +606,7 @@
           <a:p>
             <a:fld id="{258C3A4D-8173-4480-8839-1F414A4844D0}" type="datetimeFigureOut">
               <a:rPr lang="en-US" smtClean="0"/>
-              <a:t>5/1/2020</a:t>
+              <a:t>6/9/2020</a:t>
             </a:fld>
             <a:endParaRPr lang="en-US"/>
           </a:p>
@@ -758,7 +776,7 @@
           <a:p>
             <a:fld id="{258C3A4D-8173-4480-8839-1F414A4844D0}" type="datetimeFigureOut">
               <a:rPr lang="en-US" smtClean="0"/>
-              <a:t>5/1/2020</a:t>
+              <a:t>6/9/2020</a:t>
             </a:fld>
             <a:endParaRPr lang="en-US"/>
           </a:p>
@@ -1004,7 +1022,7 @@
           <a:p>
             <a:fld id="{258C3A4D-8173-4480-8839-1F414A4844D0}" type="datetimeFigureOut">
               <a:rPr lang="en-US" smtClean="0"/>
-              <a:t>5/1/2020</a:t>
+              <a:t>6/9/2020</a:t>
             </a:fld>
             <a:endParaRPr lang="en-US"/>
           </a:p>
@@ -1236,7 +1254,7 @@
           <a:p>
             <a:fld id="{258C3A4D-8173-4480-8839-1F414A4844D0}" type="datetimeFigureOut">
               <a:rPr lang="en-US" smtClean="0"/>
-              <a:t>5/1/2020</a:t>
+              <a:t>6/9/2020</a:t>
             </a:fld>
             <a:endParaRPr lang="en-US"/>
           </a:p>
@@ -1603,7 +1621,7 @@
           <a:p>
             <a:fld id="{258C3A4D-8173-4480-8839-1F414A4844D0}" type="datetimeFigureOut">
               <a:rPr lang="en-US" smtClean="0"/>
-              <a:t>5/1/2020</a:t>
+              <a:t>6/9/2020</a:t>
             </a:fld>
             <a:endParaRPr lang="en-US"/>
           </a:p>
@@ -1721,7 +1739,7 @@
           <a:p>
             <a:fld id="{258C3A4D-8173-4480-8839-1F414A4844D0}" type="datetimeFigureOut">
               <a:rPr lang="en-US" smtClean="0"/>
-              <a:t>5/1/2020</a:t>
+              <a:t>6/9/2020</a:t>
             </a:fld>
             <a:endParaRPr lang="en-US"/>
           </a:p>
@@ -1816,7 +1834,7 @@
           <a:p>
             <a:fld id="{258C3A4D-8173-4480-8839-1F414A4844D0}" type="datetimeFigureOut">
               <a:rPr lang="en-US" smtClean="0"/>
-              <a:t>5/1/2020</a:t>
+              <a:t>6/9/2020</a:t>
             </a:fld>
             <a:endParaRPr lang="en-US"/>
           </a:p>
@@ -2093,7 +2111,7 @@
           <a:p>
             <a:fld id="{258C3A4D-8173-4480-8839-1F414A4844D0}" type="datetimeFigureOut">
               <a:rPr lang="en-US" smtClean="0"/>
-              <a:t>5/1/2020</a:t>
+              <a:t>6/9/2020</a:t>
             </a:fld>
             <a:endParaRPr lang="en-US"/>
           </a:p>
@@ -2346,7 +2364,7 @@
           <a:p>
             <a:fld id="{258C3A4D-8173-4480-8839-1F414A4844D0}" type="datetimeFigureOut">
               <a:rPr lang="en-US" smtClean="0"/>
-              <a:t>5/1/2020</a:t>
+              <a:t>6/9/2020</a:t>
             </a:fld>
             <a:endParaRPr lang="en-US"/>
           </a:p>
@@ -2559,7 +2577,7 @@
           <a:p>
             <a:fld id="{258C3A4D-8173-4480-8839-1F414A4844D0}" type="datetimeFigureOut">
               <a:rPr lang="en-US" smtClean="0"/>
-              <a:t>5/1/2020</a:t>
+              <a:t>6/9/2020</a:t>
             </a:fld>
             <a:endParaRPr lang="en-US"/>
           </a:p>
@@ -3289,6 +3307,150 @@
 </p:sld>
 </file>
 
+<file path=ppt/slides/slide2.xml><?xml version="1.0" encoding="utf-8"?>
+<p:sld xmlns:a="http://schemas.openxmlformats.org/drawingml/2006/main" xmlns:r="http://schemas.openxmlformats.org/officeDocument/2006/relationships" xmlns:p="http://schemas.openxmlformats.org/presentationml/2006/main">
+  <p:cSld>
+    <p:spTree>
+      <p:nvGrpSpPr>
+        <p:cNvPr id="1" name=""/>
+        <p:cNvGrpSpPr/>
+        <p:nvPr/>
+      </p:nvGrpSpPr>
+      <p:grpSpPr>
+        <a:xfrm>
+          <a:off x="0" y="0"/>
+          <a:ext cx="0" cy="0"/>
+          <a:chOff x="0" y="0"/>
+          <a:chExt cx="0" cy="0"/>
+        </a:xfrm>
+      </p:grpSpPr>
+      <p:grpSp>
+        <p:nvGrpSpPr>
+          <p:cNvPr id="3" name="Group 2"/>
+          <p:cNvGrpSpPr/>
+          <p:nvPr/>
+        </p:nvGrpSpPr>
+        <p:grpSpPr>
+          <a:xfrm>
+            <a:off x="1909560" y="1711036"/>
+            <a:ext cx="3659967" cy="2543175"/>
+            <a:chOff x="1909560" y="1711036"/>
+            <a:chExt cx="3659967" cy="2543175"/>
+          </a:xfrm>
+        </p:grpSpPr>
+        <p:pic>
+          <p:nvPicPr>
+            <p:cNvPr id="1026" name="Picture 2" descr="https://lh5.googleusercontent.com/yu0U4C6SHsNUEpWuBjWrE0qaUOK_RTLNXIfKoToS4PlIjYSAx2AD78hGCDUtrofXprhYll3hryGifJ8OnUD84qnJO6aAiev3uSDKSc19vVtwAwN0_tlnpcKZIN4TvUgYzNhHc8Hh"/>
+            <p:cNvPicPr>
+              <a:picLocks noChangeAspect="1" noChangeArrowheads="1"/>
+            </p:cNvPicPr>
+            <p:nvPr/>
+          </p:nvPicPr>
+          <p:blipFill rotWithShape="1">
+            <a:blip r:embed="rId2">
+              <a:extLst>
+                <a:ext uri="{28A0092B-C50C-407E-A947-70E740481C1C}">
+                  <a14:useLocalDpi xmlns:a14="http://schemas.microsoft.com/office/drawing/2010/main" val="0"/>
+                </a:ext>
+              </a:extLst>
+            </a:blip>
+            <a:srcRect r="50032"/>
+            <a:stretch/>
+          </p:blipFill>
+          <p:spPr bwMode="auto">
+            <a:xfrm>
+              <a:off x="1909560" y="1711036"/>
+              <a:ext cx="3659967" cy="2543175"/>
+            </a:xfrm>
+            <a:prstGeom prst="rect">
+              <a:avLst/>
+            </a:prstGeom>
+            <a:noFill/>
+            <a:extLst>
+              <a:ext uri="{909E8E84-426E-40DD-AFC4-6F175D3DCCD1}">
+                <a14:hiddenFill xmlns:a14="http://schemas.microsoft.com/office/drawing/2010/main">
+                  <a:solidFill>
+                    <a:srgbClr val="FFFFFF"/>
+                  </a:solidFill>
+                </a14:hiddenFill>
+              </a:ext>
+            </a:extLst>
+          </p:spPr>
+        </p:pic>
+        <p:sp>
+          <p:nvSpPr>
+            <p:cNvPr id="2" name="TextBox 1"/>
+            <p:cNvSpPr txBox="1"/>
+            <p:nvPr/>
+          </p:nvSpPr>
+          <p:spPr>
+            <a:xfrm>
+              <a:off x="3084945" y="2669309"/>
+              <a:ext cx="1200728" cy="261610"/>
+            </a:xfrm>
+            <a:prstGeom prst="rect">
+              <a:avLst/>
+            </a:prstGeom>
+            <a:noFill/>
+          </p:spPr>
+          <p:txBody>
+            <a:bodyPr wrap="square" rtlCol="0">
+              <a:spAutoFit/>
+            </a:bodyPr>
+            <a:lstStyle/>
+            <a:p>
+              <a:r>
+                <a:rPr lang="en-US" sz="1050" dirty="0" smtClean="0"/>
+                <a:t>(Average year)</a:t>
+              </a:r>
+              <a:endParaRPr lang="en-US" sz="1050" dirty="0"/>
+            </a:p>
+          </p:txBody>
+        </p:sp>
+        <p:sp>
+          <p:nvSpPr>
+            <p:cNvPr id="4" name="TextBox 3"/>
+            <p:cNvSpPr txBox="1"/>
+            <p:nvPr/>
+          </p:nvSpPr>
+          <p:spPr>
+            <a:xfrm>
+              <a:off x="3084945" y="2332182"/>
+              <a:ext cx="1200728" cy="261610"/>
+            </a:xfrm>
+            <a:prstGeom prst="rect">
+              <a:avLst/>
+            </a:prstGeom>
+            <a:noFill/>
+          </p:spPr>
+          <p:txBody>
+            <a:bodyPr wrap="square" rtlCol="0">
+              <a:spAutoFit/>
+            </a:bodyPr>
+            <a:lstStyle/>
+            <a:p>
+              <a:r>
+                <a:rPr lang="en-US" sz="1050" dirty="0" smtClean="0"/>
+                <a:t>(Wet year)</a:t>
+              </a:r>
+              <a:endParaRPr lang="en-US" sz="1050" dirty="0"/>
+            </a:p>
+          </p:txBody>
+        </p:sp>
+      </p:grpSp>
+    </p:spTree>
+    <p:extLst>
+      <p:ext uri="{BB962C8B-B14F-4D97-AF65-F5344CB8AC3E}">
+        <p14:creationId xmlns:p14="http://schemas.microsoft.com/office/powerpoint/2010/main" val="2143502612"/>
+      </p:ext>
+    </p:extLst>
+  </p:cSld>
+  <p:clrMapOvr>
+    <a:masterClrMapping/>
+  </p:clrMapOvr>
+</p:sld>
+</file>
+
 <file path=ppt/theme/theme1.xml><?xml version="1.0" encoding="utf-8"?>
 <a:theme xmlns:a="http://schemas.openxmlformats.org/drawingml/2006/main" name="Office Theme">
   <a:themeElements>

</xml_diff>